<commit_message>
Slide tweek and updates to demos.
</commit_message>
<xml_diff>
--- a/Slides/Module 5 - Jinja Layouts.pptx
+++ b/Slides/Module 5 - Jinja Layouts.pptx
@@ -224,7 +224,7 @@
           <a:p>
             <a:fld id="{312E7B4A-039C-48A2-9B2C-AF16AA3873D8}" type="datetimeFigureOut">
               <a:rPr lang="en-US" smtClean="0"/>
-              <a:t>2/16/2015</a:t>
+              <a:t>2/26/2015</a:t>
             </a:fld>
             <a:endParaRPr lang="en-US"/>
           </a:p>
@@ -389,7 +389,7 @@
           <a:p>
             <a:fld id="{DA005A0C-54D9-45AA-87D4-C551D08DFCE1}" type="datetimeFigureOut">
               <a:rPr lang="en-US" smtClean="0"/>
-              <a:t>2/16/2015</a:t>
+              <a:t>2/26/2015</a:t>
             </a:fld>
             <a:endParaRPr lang="en-US"/>
           </a:p>
@@ -6271,7 +6271,7 @@
               </a:spcBef>
             </a:pPr>
             <a:r>
-              <a:rPr lang="en-US" sz="3200" kern="0" dirty="0">
+              <a:rPr lang="en-US" sz="2800" kern="0" dirty="0">
                 <a:solidFill>
                   <a:prstClr val="black"/>
                 </a:solidFill>
@@ -6281,7 +6281,17 @@
               <a:t>{% extends </a:t>
             </a:r>
             <a:r>
-              <a:rPr lang="en-US" sz="3200" i="1" kern="0" dirty="0">
+              <a:rPr lang="en-US" sz="2800" kern="0" dirty="0" smtClean="0">
+                <a:solidFill>
+                  <a:prstClr val="black"/>
+                </a:solidFill>
+                <a:latin typeface="Consolas" panose="020B0609020204030204" pitchFamily="49" charset="0"/>
+                <a:cs typeface="Consolas" panose="020B0609020204030204" pitchFamily="49" charset="0"/>
+              </a:rPr>
+              <a:t>"</a:t>
+            </a:r>
+            <a:r>
+              <a:rPr lang="en-US" sz="2800" i="1" kern="0" dirty="0" smtClean="0">
                 <a:solidFill>
                   <a:prstClr val="black"/>
                 </a:solidFill>
@@ -6291,14 +6301,24 @@
               <a:t>baseName.html</a:t>
             </a:r>
             <a:r>
-              <a:rPr lang="en-US" sz="3200" kern="0" dirty="0">
+              <a:rPr lang="en-US" sz="2800" kern="0" dirty="0" smtClean="0">
                 <a:solidFill>
                   <a:prstClr val="black"/>
                 </a:solidFill>
                 <a:latin typeface="Consolas" panose="020B0609020204030204" pitchFamily="49" charset="0"/>
                 <a:cs typeface="Consolas" panose="020B0609020204030204" pitchFamily="49" charset="0"/>
               </a:rPr>
-              <a:t> %}</a:t>
+              <a:t>" </a:t>
+            </a:r>
+            <a:r>
+              <a:rPr lang="en-US" sz="2800" kern="0" dirty="0">
+                <a:solidFill>
+                  <a:prstClr val="black"/>
+                </a:solidFill>
+                <a:latin typeface="Consolas" panose="020B0609020204030204" pitchFamily="49" charset="0"/>
+                <a:cs typeface="Consolas" panose="020B0609020204030204" pitchFamily="49" charset="0"/>
+              </a:rPr>
+              <a:t>%}</a:t>
             </a:r>
           </a:p>
         </p:txBody>
@@ -12085,21 +12105,6 @@
 </file>
 
 <file path=customXml/item1.xml><?xml version="1.0" encoding="utf-8"?>
-<p:properties xmlns:p="http://schemas.microsoft.com/office/2006/metadata/properties" xmlns:xsi="http://www.w3.org/2001/XMLSchema-instance" xmlns:pc="http://schemas.microsoft.com/office/infopath/2007/PartnerControls">
-  <documentManagement/>
-</p:properties>
-</file>
-
-<file path=customXml/item2.xml><?xml version="1.0" encoding="utf-8"?>
-<?mso-contentType ?>
-<FormTemplates xmlns="http://schemas.microsoft.com/sharepoint/v3/contenttype/forms">
-  <Display>DocumentLibraryForm</Display>
-  <Edit>DocumentLibraryForm</Edit>
-  <New>DocumentLibraryForm</New>
-</FormTemplates>
-</file>
-
-<file path=customXml/item3.xml><?xml version="1.0" encoding="utf-8"?>
 <ct:contentTypeSchema xmlns:ct="http://schemas.microsoft.com/office/2006/metadata/contentType" xmlns:ma="http://schemas.microsoft.com/office/2006/metadata/properties/metaAttributes" ct:_="" ma:_="" ma:contentTypeName="Document" ma:contentTypeID="0x010100BD9BF63586D9884E9335F37127EABBE8" ma:contentTypeVersion="1" ma:contentTypeDescription="Create a new document." ma:contentTypeScope="" ma:versionID="b9abee3a6b7d355b9c1a31dbb76ab4bc">
   <xsd:schema xmlns:xsd="http://www.w3.org/2001/XMLSchema" xmlns:xs="http://www.w3.org/2001/XMLSchema" xmlns:p="http://schemas.microsoft.com/office/2006/metadata/properties" xmlns:ns3="e5a13ba8-98e3-4f23-a221-7ac9824aa662" targetNamespace="http://schemas.microsoft.com/office/2006/metadata/properties" ma:root="true" ma:fieldsID="9d02d2e6bc0f5948a1713c06f6c13b3b" ns3:_="">
     <xsd:import namespace="e5a13ba8-98e3-4f23-a221-7ac9824aa662"/>
@@ -12239,31 +12244,22 @@
 </ct:contentTypeSchema>
 </file>
 
-<file path=customXml/itemProps1.xml><?xml version="1.0" encoding="utf-8"?>
-<ds:datastoreItem xmlns:ds="http://schemas.openxmlformats.org/officeDocument/2006/customXml" ds:itemID="{7025FDD9-4C58-4084-9F89-0E6ADD6FFF55}">
-  <ds:schemaRefs>
-    <ds:schemaRef ds:uri="http://purl.org/dc/terms/"/>
-    <ds:schemaRef ds:uri="http://schemas.openxmlformats.org/package/2006/metadata/core-properties"/>
-    <ds:schemaRef ds:uri="http://schemas.microsoft.com/office/2006/documentManagement/types"/>
-    <ds:schemaRef ds:uri="http://schemas.microsoft.com/office/infopath/2007/PartnerControls"/>
-    <ds:schemaRef ds:uri="http://purl.org/dc/elements/1.1/"/>
-    <ds:schemaRef ds:uri="http://schemas.microsoft.com/office/2006/metadata/properties"/>
-    <ds:schemaRef ds:uri="e5a13ba8-98e3-4f23-a221-7ac9824aa662"/>
-    <ds:schemaRef ds:uri="http://www.w3.org/XML/1998/namespace"/>
-    <ds:schemaRef ds:uri="http://purl.org/dc/dcmitype/"/>
-  </ds:schemaRefs>
-</ds:datastoreItem>
+<file path=customXml/item2.xml><?xml version="1.0" encoding="utf-8"?>
+<?mso-contentType ?>
+<FormTemplates xmlns="http://schemas.microsoft.com/sharepoint/v3/contenttype/forms">
+  <Display>DocumentLibraryForm</Display>
+  <Edit>DocumentLibraryForm</Edit>
+  <New>DocumentLibraryForm</New>
+</FormTemplates>
 </file>
 
-<file path=customXml/itemProps2.xml><?xml version="1.0" encoding="utf-8"?>
-<ds:datastoreItem xmlns:ds="http://schemas.openxmlformats.org/officeDocument/2006/customXml" ds:itemID="{B0CA13EC-1D3C-4D6F-8D1C-E8A452CFC79A}">
-  <ds:schemaRefs>
-    <ds:schemaRef ds:uri="http://schemas.microsoft.com/sharepoint/v3/contenttype/forms"/>
-  </ds:schemaRefs>
-</ds:datastoreItem>
+<file path=customXml/item3.xml><?xml version="1.0" encoding="utf-8"?>
+<p:properties xmlns:p="http://schemas.microsoft.com/office/2006/metadata/properties" xmlns:xsi="http://www.w3.org/2001/XMLSchema-instance" xmlns:pc="http://schemas.microsoft.com/office/infopath/2007/PartnerControls">
+  <documentManagement/>
+</p:properties>
 </file>
 
-<file path=customXml/itemProps3.xml><?xml version="1.0" encoding="utf-8"?>
+<file path=customXml/itemProps1.xml><?xml version="1.0" encoding="utf-8"?>
 <ds:datastoreItem xmlns:ds="http://schemas.openxmlformats.org/officeDocument/2006/customXml" ds:itemID="{1E1E45CC-2FEE-40FA-AA55-B597D74C6344}">
   <ds:schemaRefs>
     <ds:schemaRef ds:uri="http://schemas.microsoft.com/office/2006/metadata/contentType"/>
@@ -12279,4 +12275,28 @@
     <ds:schemaRef ds:uri="http://schemas.microsoft.com/internal/obd"/>
   </ds:schemaRefs>
 </ds:datastoreItem>
+</file>
+
+<file path=customXml/itemProps2.xml><?xml version="1.0" encoding="utf-8"?>
+<ds:datastoreItem xmlns:ds="http://schemas.openxmlformats.org/officeDocument/2006/customXml" ds:itemID="{B0CA13EC-1D3C-4D6F-8D1C-E8A452CFC79A}">
+  <ds:schemaRefs>
+    <ds:schemaRef ds:uri="http://schemas.microsoft.com/sharepoint/v3/contenttype/forms"/>
+  </ds:schemaRefs>
+</ds:datastoreItem>
+</file>
+
+<file path=customXml/itemProps3.xml><?xml version="1.0" encoding="utf-8"?>
+<ds:datastoreItem xmlns:ds="http://schemas.openxmlformats.org/officeDocument/2006/customXml" ds:itemID="{7025FDD9-4C58-4084-9F89-0E6ADD6FFF55}">
+  <ds:schemaRefs>
+    <ds:schemaRef ds:uri="http://purl.org/dc/terms/"/>
+    <ds:schemaRef ds:uri="http://schemas.openxmlformats.org/package/2006/metadata/core-properties"/>
+    <ds:schemaRef ds:uri="http://schemas.microsoft.com/office/2006/documentManagement/types"/>
+    <ds:schemaRef ds:uri="http://schemas.microsoft.com/office/infopath/2007/PartnerControls"/>
+    <ds:schemaRef ds:uri="http://purl.org/dc/elements/1.1/"/>
+    <ds:schemaRef ds:uri="http://schemas.microsoft.com/office/2006/metadata/properties"/>
+    <ds:schemaRef ds:uri="e5a13ba8-98e3-4f23-a221-7ac9824aa662"/>
+    <ds:schemaRef ds:uri="http://www.w3.org/XML/1998/namespace"/>
+    <ds:schemaRef ds:uri="http://purl.org/dc/dcmitype/"/>
+  </ds:schemaRefs>
+</ds:datastoreItem>
 </file>
</xml_diff>

<commit_message>
Module 5 slides update (temp)
</commit_message>
<xml_diff>
--- a/Slides/Module 5 - Jinja Layouts.pptx
+++ b/Slides/Module 5 - Jinja Layouts.pptx
@@ -5,10 +5,10 @@
     <p:sldMasterId id="2147483660" r:id="rId4"/>
   </p:sldMasterIdLst>
   <p:notesMasterIdLst>
-    <p:notesMasterId r:id="rId27"/>
+    <p:notesMasterId r:id="rId32"/>
   </p:notesMasterIdLst>
   <p:handoutMasterIdLst>
-    <p:handoutMasterId r:id="rId28"/>
+    <p:handoutMasterId r:id="rId33"/>
   </p:handoutMasterIdLst>
   <p:sldIdLst>
     <p:sldId id="277" r:id="rId5"/>
@@ -33,6 +33,11 @@
     <p:sldId id="302" r:id="rId24"/>
     <p:sldId id="298" r:id="rId25"/>
     <p:sldId id="285" r:id="rId26"/>
+    <p:sldId id="306" r:id="rId27"/>
+    <p:sldId id="305" r:id="rId28"/>
+    <p:sldId id="307" r:id="rId29"/>
+    <p:sldId id="308" r:id="rId30"/>
+    <p:sldId id="309" r:id="rId31"/>
   </p:sldIdLst>
   <p:sldSz cx="12192000" cy="6858000"/>
   <p:notesSz cx="6858000" cy="9144000"/>
@@ -224,7 +229,7 @@
           <a:p>
             <a:fld id="{312E7B4A-039C-48A2-9B2C-AF16AA3873D8}" type="datetimeFigureOut">
               <a:rPr lang="en-US" smtClean="0"/>
-              <a:t>2/26/2015</a:t>
+              <a:t>2/27/2015</a:t>
             </a:fld>
             <a:endParaRPr lang="en-US"/>
           </a:p>
@@ -389,7 +394,7 @@
           <a:p>
             <a:fld id="{DA005A0C-54D9-45AA-87D4-C551D08DFCE1}" type="datetimeFigureOut">
               <a:rPr lang="en-US" smtClean="0"/>
-              <a:t>2/26/2015</a:t>
+              <a:t>2/27/2015</a:t>
             </a:fld>
             <a:endParaRPr lang="en-US"/>
           </a:p>
@@ -10271,6 +10276,469 @@
       </p:par>
     </p:tnLst>
   </p:timing>
+</p:sld>
+</file>
+
+<file path=ppt/slides/slide23.xml><?xml version="1.0" encoding="utf-8"?>
+<p:sld xmlns:a="http://schemas.openxmlformats.org/drawingml/2006/main" xmlns:r="http://schemas.openxmlformats.org/officeDocument/2006/relationships" xmlns:p="http://schemas.openxmlformats.org/presentationml/2006/main">
+  <p:cSld>
+    <p:spTree>
+      <p:nvGrpSpPr>
+        <p:cNvPr id="1" name=""/>
+        <p:cNvGrpSpPr/>
+        <p:nvPr/>
+      </p:nvGrpSpPr>
+      <p:grpSpPr>
+        <a:xfrm>
+          <a:off x="0" y="0"/>
+          <a:ext cx="0" cy="0"/>
+          <a:chOff x="0" y="0"/>
+          <a:chExt cx="0" cy="0"/>
+        </a:xfrm>
+      </p:grpSpPr>
+      <p:sp>
+        <p:nvSpPr>
+          <p:cNvPr id="2" name="Title 1"/>
+          <p:cNvSpPr>
+            <a:spLocks noGrp="1"/>
+          </p:cNvSpPr>
+          <p:nvPr>
+            <p:ph type="title"/>
+          </p:nvPr>
+        </p:nvSpPr>
+        <p:spPr/>
+        <p:txBody>
+          <a:bodyPr/>
+          <a:lstStyle/>
+          <a:p>
+            <a:r>
+              <a:rPr lang="en-US" dirty="0" smtClean="0"/>
+              <a:t>What did we learn today?</a:t>
+            </a:r>
+            <a:endParaRPr lang="en-US" dirty="0"/>
+          </a:p>
+        </p:txBody>
+      </p:sp>
+      <p:sp>
+        <p:nvSpPr>
+          <p:cNvPr id="3" name="Content Placeholder 2"/>
+          <p:cNvSpPr>
+            <a:spLocks noGrp="1"/>
+          </p:cNvSpPr>
+          <p:nvPr>
+            <p:ph sz="quarter" idx="10"/>
+          </p:nvPr>
+        </p:nvSpPr>
+        <p:spPr/>
+        <p:txBody>
+          <a:bodyPr/>
+          <a:lstStyle/>
+          <a:p>
+            <a:r>
+              <a:rPr lang="en-US" dirty="0" smtClean="0"/>
+              <a:t>Advanced layouts in </a:t>
+            </a:r>
+            <a:r>
+              <a:rPr lang="en-US" dirty="0" err="1" smtClean="0"/>
+              <a:t>Jinja</a:t>
+            </a:r>
+            <a:endParaRPr lang="en-US" dirty="0" smtClean="0"/>
+          </a:p>
+          <a:p>
+            <a:r>
+              <a:rPr lang="en-US" dirty="0" smtClean="0"/>
+              <a:t>How to use a relational database</a:t>
+            </a:r>
+          </a:p>
+          <a:p>
+            <a:r>
+              <a:rPr lang="en-US" dirty="0" smtClean="0"/>
+              <a:t>A bit of Bootstrap</a:t>
+            </a:r>
+          </a:p>
+          <a:p>
+            <a:r>
+              <a:rPr lang="en-US" dirty="0" smtClean="0"/>
+              <a:t>Object oriented design</a:t>
+            </a:r>
+            <a:endParaRPr lang="en-US" dirty="0"/>
+          </a:p>
+        </p:txBody>
+      </p:sp>
+    </p:spTree>
+    <p:extLst>
+      <p:ext uri="{BB962C8B-B14F-4D97-AF65-F5344CB8AC3E}">
+        <p14:creationId xmlns:p14="http://schemas.microsoft.com/office/powerpoint/2010/main" val="708225977"/>
+      </p:ext>
+    </p:extLst>
+  </p:cSld>
+  <p:clrMapOvr>
+    <a:masterClrMapping/>
+  </p:clrMapOvr>
+  <mc:AlternateContent xmlns:mc="http://schemas.openxmlformats.org/markup-compatibility/2006">
+    <mc:Choice xmlns:p14="http://schemas.microsoft.com/office/powerpoint/2010/main" Requires="p14">
+      <p:transition spd="slow" p14:dur="2000"/>
+    </mc:Choice>
+    <mc:Fallback>
+      <p:transition spd="slow"/>
+    </mc:Fallback>
+  </mc:AlternateContent>
+</p:sld>
+</file>
+
+<file path=ppt/slides/slide24.xml><?xml version="1.0" encoding="utf-8"?>
+<p:sld xmlns:a="http://schemas.openxmlformats.org/drawingml/2006/main" xmlns:r="http://schemas.openxmlformats.org/officeDocument/2006/relationships" xmlns:p="http://schemas.openxmlformats.org/presentationml/2006/main">
+  <p:cSld>
+    <p:spTree>
+      <p:nvGrpSpPr>
+        <p:cNvPr id="1" name=""/>
+        <p:cNvGrpSpPr/>
+        <p:nvPr/>
+      </p:nvGrpSpPr>
+      <p:grpSpPr>
+        <a:xfrm>
+          <a:off x="0" y="0"/>
+          <a:ext cx="0" cy="0"/>
+          <a:chOff x="0" y="0"/>
+          <a:chExt cx="0" cy="0"/>
+        </a:xfrm>
+      </p:grpSpPr>
+      <p:sp>
+        <p:nvSpPr>
+          <p:cNvPr id="2" name="Title 1"/>
+          <p:cNvSpPr>
+            <a:spLocks noGrp="1"/>
+          </p:cNvSpPr>
+          <p:nvPr>
+            <p:ph type="title"/>
+          </p:nvPr>
+        </p:nvSpPr>
+        <p:spPr/>
+        <p:txBody>
+          <a:bodyPr/>
+          <a:lstStyle/>
+          <a:p>
+            <a:r>
+              <a:rPr lang="en-US" dirty="0" smtClean="0"/>
+              <a:t>Where do we go now?</a:t>
+            </a:r>
+            <a:endParaRPr lang="en-US" dirty="0"/>
+          </a:p>
+        </p:txBody>
+      </p:sp>
+      <p:sp>
+        <p:nvSpPr>
+          <p:cNvPr id="3" name="Content Placeholder 2"/>
+          <p:cNvSpPr>
+            <a:spLocks noGrp="1"/>
+          </p:cNvSpPr>
+          <p:nvPr>
+            <p:ph sz="quarter" idx="10"/>
+          </p:nvPr>
+        </p:nvSpPr>
+        <p:spPr/>
+        <p:txBody>
+          <a:bodyPr/>
+          <a:lstStyle/>
+          <a:p>
+            <a:r>
+              <a:rPr lang="en-US" dirty="0" smtClean="0"/>
+              <a:t>For your growth</a:t>
+            </a:r>
+          </a:p>
+          <a:p>
+            <a:pPr lvl="1"/>
+            <a:r>
+              <a:rPr lang="en-US" dirty="0" smtClean="0"/>
+              <a:t>What interested you the most?</a:t>
+            </a:r>
+          </a:p>
+          <a:p>
+            <a:r>
+              <a:rPr lang="en-US" dirty="0" smtClean="0"/>
+              <a:t>For a deeper understanding</a:t>
+            </a:r>
+          </a:p>
+          <a:p>
+            <a:pPr lvl="1"/>
+            <a:r>
+              <a:rPr lang="en-US" dirty="0" smtClean="0"/>
+              <a:t>What can we do with the app?</a:t>
+            </a:r>
+            <a:endParaRPr lang="en-US" dirty="0"/>
+          </a:p>
+        </p:txBody>
+      </p:sp>
+    </p:spTree>
+    <p:extLst>
+      <p:ext uri="{BB962C8B-B14F-4D97-AF65-F5344CB8AC3E}">
+        <p14:creationId xmlns:p14="http://schemas.microsoft.com/office/powerpoint/2010/main" val="2467499197"/>
+      </p:ext>
+    </p:extLst>
+  </p:cSld>
+  <p:clrMapOvr>
+    <a:masterClrMapping/>
+  </p:clrMapOvr>
+</p:sld>
+</file>
+
+<file path=ppt/slides/slide25.xml><?xml version="1.0" encoding="utf-8"?>
+<p:sld xmlns:a="http://schemas.openxmlformats.org/drawingml/2006/main" xmlns:r="http://schemas.openxmlformats.org/officeDocument/2006/relationships" xmlns:p="http://schemas.openxmlformats.org/presentationml/2006/main">
+  <p:cSld>
+    <p:spTree>
+      <p:nvGrpSpPr>
+        <p:cNvPr id="1" name=""/>
+        <p:cNvGrpSpPr/>
+        <p:nvPr/>
+      </p:nvGrpSpPr>
+      <p:grpSpPr>
+        <a:xfrm>
+          <a:off x="0" y="0"/>
+          <a:ext cx="0" cy="0"/>
+          <a:chOff x="0" y="0"/>
+          <a:chExt cx="0" cy="0"/>
+        </a:xfrm>
+      </p:grpSpPr>
+      <p:sp>
+        <p:nvSpPr>
+          <p:cNvPr id="2" name="Title 1"/>
+          <p:cNvSpPr>
+            <a:spLocks noGrp="1"/>
+          </p:cNvSpPr>
+          <p:nvPr>
+            <p:ph type="title"/>
+          </p:nvPr>
+        </p:nvSpPr>
+        <p:spPr/>
+        <p:txBody>
+          <a:bodyPr/>
+          <a:lstStyle/>
+          <a:p>
+            <a:r>
+              <a:rPr lang="en-US" dirty="0" smtClean="0"/>
+              <a:t>Data design</a:t>
+            </a:r>
+            <a:endParaRPr lang="en-US" dirty="0"/>
+          </a:p>
+        </p:txBody>
+      </p:sp>
+      <p:sp>
+        <p:nvSpPr>
+          <p:cNvPr id="3" name="Content Placeholder 2"/>
+          <p:cNvSpPr>
+            <a:spLocks noGrp="1"/>
+          </p:cNvSpPr>
+          <p:nvPr>
+            <p:ph sz="quarter" idx="10"/>
+          </p:nvPr>
+        </p:nvSpPr>
+        <p:spPr/>
+        <p:txBody>
+          <a:bodyPr/>
+          <a:lstStyle/>
+          <a:p>
+            <a:r>
+              <a:rPr lang="en-US" dirty="0" err="1" smtClean="0"/>
+              <a:t>Redis</a:t>
+            </a:r>
+            <a:r>
+              <a:rPr lang="en-US" dirty="0" smtClean="0"/>
+              <a:t> MVA</a:t>
+            </a:r>
+          </a:p>
+          <a:p>
+            <a:r>
+              <a:rPr lang="en-US" dirty="0" smtClean="0"/>
+              <a:t>SQL Server MVA</a:t>
+            </a:r>
+          </a:p>
+          <a:p>
+            <a:r>
+              <a:rPr lang="en-US" dirty="0" err="1" smtClean="0"/>
+              <a:t>MongoDB</a:t>
+            </a:r>
+            <a:r>
+              <a:rPr lang="en-US" dirty="0" smtClean="0"/>
+              <a:t> MVA</a:t>
+            </a:r>
+            <a:endParaRPr lang="en-US" dirty="0"/>
+          </a:p>
+        </p:txBody>
+      </p:sp>
+    </p:spTree>
+    <p:extLst>
+      <p:ext uri="{BB962C8B-B14F-4D97-AF65-F5344CB8AC3E}">
+        <p14:creationId xmlns:p14="http://schemas.microsoft.com/office/powerpoint/2010/main" val="745934202"/>
+      </p:ext>
+    </p:extLst>
+  </p:cSld>
+  <p:clrMapOvr>
+    <a:masterClrMapping/>
+  </p:clrMapOvr>
+</p:sld>
+</file>
+
+<file path=ppt/slides/slide26.xml><?xml version="1.0" encoding="utf-8"?>
+<p:sld xmlns:a="http://schemas.openxmlformats.org/drawingml/2006/main" xmlns:r="http://schemas.openxmlformats.org/officeDocument/2006/relationships" xmlns:p="http://schemas.openxmlformats.org/presentationml/2006/main">
+  <p:cSld>
+    <p:spTree>
+      <p:nvGrpSpPr>
+        <p:cNvPr id="1" name=""/>
+        <p:cNvGrpSpPr/>
+        <p:nvPr/>
+      </p:nvGrpSpPr>
+      <p:grpSpPr>
+        <a:xfrm>
+          <a:off x="0" y="0"/>
+          <a:ext cx="0" cy="0"/>
+          <a:chOff x="0" y="0"/>
+          <a:chExt cx="0" cy="0"/>
+        </a:xfrm>
+      </p:grpSpPr>
+      <p:sp>
+        <p:nvSpPr>
+          <p:cNvPr id="2" name="Title 1"/>
+          <p:cNvSpPr>
+            <a:spLocks noGrp="1"/>
+          </p:cNvSpPr>
+          <p:nvPr>
+            <p:ph type="title"/>
+          </p:nvPr>
+        </p:nvSpPr>
+        <p:spPr/>
+        <p:txBody>
+          <a:bodyPr/>
+          <a:lstStyle/>
+          <a:p>
+            <a:r>
+              <a:rPr lang="en-US" dirty="0" smtClean="0"/>
+              <a:t>Front end design</a:t>
+            </a:r>
+            <a:endParaRPr lang="en-US" dirty="0"/>
+          </a:p>
+        </p:txBody>
+      </p:sp>
+      <p:sp>
+        <p:nvSpPr>
+          <p:cNvPr id="3" name="Content Placeholder 2"/>
+          <p:cNvSpPr>
+            <a:spLocks noGrp="1"/>
+          </p:cNvSpPr>
+          <p:nvPr>
+            <p:ph sz="quarter" idx="10"/>
+          </p:nvPr>
+        </p:nvSpPr>
+        <p:spPr/>
+        <p:txBody>
+          <a:bodyPr/>
+          <a:lstStyle/>
+          <a:p>
+            <a:r>
+              <a:rPr lang="en-US" dirty="0" smtClean="0"/>
+              <a:t>Bootstrap MVA</a:t>
+            </a:r>
+          </a:p>
+          <a:p>
+            <a:r>
+              <a:rPr lang="en-US" dirty="0" smtClean="0"/>
+              <a:t>CSS MVA</a:t>
+            </a:r>
+            <a:endParaRPr lang="en-US" dirty="0"/>
+          </a:p>
+        </p:txBody>
+      </p:sp>
+    </p:spTree>
+    <p:extLst>
+      <p:ext uri="{BB962C8B-B14F-4D97-AF65-F5344CB8AC3E}">
+        <p14:creationId xmlns:p14="http://schemas.microsoft.com/office/powerpoint/2010/main" val="2328056341"/>
+      </p:ext>
+    </p:extLst>
+  </p:cSld>
+  <p:clrMapOvr>
+    <a:masterClrMapping/>
+  </p:clrMapOvr>
+</p:sld>
+</file>
+
+<file path=ppt/slides/slide27.xml><?xml version="1.0" encoding="utf-8"?>
+<p:sld xmlns:a="http://schemas.openxmlformats.org/drawingml/2006/main" xmlns:r="http://schemas.openxmlformats.org/officeDocument/2006/relationships" xmlns:p="http://schemas.openxmlformats.org/presentationml/2006/main">
+  <p:cSld>
+    <p:spTree>
+      <p:nvGrpSpPr>
+        <p:cNvPr id="1" name=""/>
+        <p:cNvGrpSpPr/>
+        <p:nvPr/>
+      </p:nvGrpSpPr>
+      <p:grpSpPr>
+        <a:xfrm>
+          <a:off x="0" y="0"/>
+          <a:ext cx="0" cy="0"/>
+          <a:chOff x="0" y="0"/>
+          <a:chExt cx="0" cy="0"/>
+        </a:xfrm>
+      </p:grpSpPr>
+      <p:sp>
+        <p:nvSpPr>
+          <p:cNvPr id="2" name="Title 1"/>
+          <p:cNvSpPr>
+            <a:spLocks noGrp="1"/>
+          </p:cNvSpPr>
+          <p:nvPr>
+            <p:ph type="title"/>
+          </p:nvPr>
+        </p:nvSpPr>
+        <p:spPr/>
+        <p:txBody>
+          <a:bodyPr/>
+          <a:lstStyle/>
+          <a:p>
+            <a:r>
+              <a:rPr lang="en-US" dirty="0" smtClean="0"/>
+              <a:t>Back end design</a:t>
+            </a:r>
+            <a:endParaRPr lang="en-US" dirty="0"/>
+          </a:p>
+        </p:txBody>
+      </p:sp>
+      <p:sp>
+        <p:nvSpPr>
+          <p:cNvPr id="3" name="Content Placeholder 2"/>
+          <p:cNvSpPr>
+            <a:spLocks noGrp="1"/>
+          </p:cNvSpPr>
+          <p:nvPr>
+            <p:ph sz="quarter" idx="10"/>
+          </p:nvPr>
+        </p:nvSpPr>
+        <p:spPr/>
+        <p:txBody>
+          <a:bodyPr/>
+          <a:lstStyle/>
+          <a:p>
+            <a:r>
+              <a:rPr lang="en-US" dirty="0" smtClean="0"/>
+              <a:t>Absolute beginner's guide to C#</a:t>
+            </a:r>
+          </a:p>
+          <a:p>
+            <a:r>
+              <a:rPr lang="en-US" dirty="0" smtClean="0"/>
+              <a:t>Introduction to MVC</a:t>
+            </a:r>
+            <a:endParaRPr lang="en-US" dirty="0"/>
+          </a:p>
+        </p:txBody>
+      </p:sp>
+    </p:spTree>
+    <p:extLst>
+      <p:ext uri="{BB962C8B-B14F-4D97-AF65-F5344CB8AC3E}">
+        <p14:creationId xmlns:p14="http://schemas.microsoft.com/office/powerpoint/2010/main" val="1215635806"/>
+      </p:ext>
+    </p:extLst>
+  </p:cSld>
+  <p:clrMapOvr>
+    <a:masterClrMapping/>
+  </p:clrMapOvr>
 </p:sld>
 </file>
 
@@ -12105,6 +12573,15 @@
 </file>
 
 <file path=customXml/item1.xml><?xml version="1.0" encoding="utf-8"?>
+<?mso-contentType ?>
+<FormTemplates xmlns="http://schemas.microsoft.com/sharepoint/v3/contenttype/forms">
+  <Display>DocumentLibraryForm</Display>
+  <Edit>DocumentLibraryForm</Edit>
+  <New>DocumentLibraryForm</New>
+</FormTemplates>
+</file>
+
+<file path=customXml/item2.xml><?xml version="1.0" encoding="utf-8"?>
 <ct:contentTypeSchema xmlns:ct="http://schemas.microsoft.com/office/2006/metadata/contentType" xmlns:ma="http://schemas.microsoft.com/office/2006/metadata/properties/metaAttributes" ct:_="" ma:_="" ma:contentTypeName="Document" ma:contentTypeID="0x010100BD9BF63586D9884E9335F37127EABBE8" ma:contentTypeVersion="1" ma:contentTypeDescription="Create a new document." ma:contentTypeScope="" ma:versionID="b9abee3a6b7d355b9c1a31dbb76ab4bc">
   <xsd:schema xmlns:xsd="http://www.w3.org/2001/XMLSchema" xmlns:xs="http://www.w3.org/2001/XMLSchema" xmlns:p="http://schemas.microsoft.com/office/2006/metadata/properties" xmlns:ns3="e5a13ba8-98e3-4f23-a221-7ac9824aa662" targetNamespace="http://schemas.microsoft.com/office/2006/metadata/properties" ma:root="true" ma:fieldsID="9d02d2e6bc0f5948a1713c06f6c13b3b" ns3:_="">
     <xsd:import namespace="e5a13ba8-98e3-4f23-a221-7ac9824aa662"/>
@@ -12244,15 +12721,6 @@
 </ct:contentTypeSchema>
 </file>
 
-<file path=customXml/item2.xml><?xml version="1.0" encoding="utf-8"?>
-<?mso-contentType ?>
-<FormTemplates xmlns="http://schemas.microsoft.com/sharepoint/v3/contenttype/forms">
-  <Display>DocumentLibraryForm</Display>
-  <Edit>DocumentLibraryForm</Edit>
-  <New>DocumentLibraryForm</New>
-</FormTemplates>
-</file>
-
 <file path=customXml/item3.xml><?xml version="1.0" encoding="utf-8"?>
 <p:properties xmlns:p="http://schemas.microsoft.com/office/2006/metadata/properties" xmlns:xsi="http://www.w3.org/2001/XMLSchema-instance" xmlns:pc="http://schemas.microsoft.com/office/infopath/2007/PartnerControls">
   <documentManagement/>
@@ -12260,6 +12728,14 @@
 </file>
 
 <file path=customXml/itemProps1.xml><?xml version="1.0" encoding="utf-8"?>
+<ds:datastoreItem xmlns:ds="http://schemas.openxmlformats.org/officeDocument/2006/customXml" ds:itemID="{B0CA13EC-1D3C-4D6F-8D1C-E8A452CFC79A}">
+  <ds:schemaRefs>
+    <ds:schemaRef ds:uri="http://schemas.microsoft.com/sharepoint/v3/contenttype/forms"/>
+  </ds:schemaRefs>
+</ds:datastoreItem>
+</file>
+
+<file path=customXml/itemProps2.xml><?xml version="1.0" encoding="utf-8"?>
 <ds:datastoreItem xmlns:ds="http://schemas.openxmlformats.org/officeDocument/2006/customXml" ds:itemID="{1E1E45CC-2FEE-40FA-AA55-B597D74C6344}">
   <ds:schemaRefs>
     <ds:schemaRef ds:uri="http://schemas.microsoft.com/office/2006/metadata/contentType"/>
@@ -12273,14 +12749,6 @@
     <ds:schemaRef ds:uri="http://purl.org/dc/elements/1.1/"/>
     <ds:schemaRef ds:uri="http://purl.org/dc/terms/"/>
     <ds:schemaRef ds:uri="http://schemas.microsoft.com/internal/obd"/>
-  </ds:schemaRefs>
-</ds:datastoreItem>
-</file>
-
-<file path=customXml/itemProps2.xml><?xml version="1.0" encoding="utf-8"?>
-<ds:datastoreItem xmlns:ds="http://schemas.openxmlformats.org/officeDocument/2006/customXml" ds:itemID="{B0CA13EC-1D3C-4D6F-8D1C-E8A452CFC79A}">
-  <ds:schemaRefs>
-    <ds:schemaRef ds:uri="http://schemas.microsoft.com/sharepoint/v3/contenttype/forms"/>
   </ds:schemaRefs>
 </ds:datastoreItem>
 </file>

</xml_diff>

<commit_message>
Module 5 and 6 slide decks
</commit_message>
<xml_diff>
--- a/Slides/Module 5 - Jinja Layouts.pptx
+++ b/Slides/Module 5 - Jinja Layouts.pptx
@@ -5,10 +5,10 @@
     <p:sldMasterId id="2147483660" r:id="rId4"/>
   </p:sldMasterIdLst>
   <p:notesMasterIdLst>
-    <p:notesMasterId r:id="rId32"/>
+    <p:notesMasterId r:id="rId27"/>
   </p:notesMasterIdLst>
   <p:handoutMasterIdLst>
-    <p:handoutMasterId r:id="rId33"/>
+    <p:handoutMasterId r:id="rId28"/>
   </p:handoutMasterIdLst>
   <p:sldIdLst>
     <p:sldId id="277" r:id="rId5"/>
@@ -33,11 +33,6 @@
     <p:sldId id="302" r:id="rId24"/>
     <p:sldId id="298" r:id="rId25"/>
     <p:sldId id="285" r:id="rId26"/>
-    <p:sldId id="306" r:id="rId27"/>
-    <p:sldId id="305" r:id="rId28"/>
-    <p:sldId id="307" r:id="rId29"/>
-    <p:sldId id="308" r:id="rId30"/>
-    <p:sldId id="309" r:id="rId31"/>
   </p:sldIdLst>
   <p:sldSz cx="12192000" cy="6858000"/>
   <p:notesSz cx="6858000" cy="9144000"/>
@@ -229,7 +224,7 @@
           <a:p>
             <a:fld id="{312E7B4A-039C-48A2-9B2C-AF16AA3873D8}" type="datetimeFigureOut">
               <a:rPr lang="en-US" smtClean="0"/>
-              <a:t>2/27/2015</a:t>
+              <a:t>3/1/2015</a:t>
             </a:fld>
             <a:endParaRPr lang="en-US"/>
           </a:p>
@@ -394,7 +389,7 @@
           <a:p>
             <a:fld id="{DA005A0C-54D9-45AA-87D4-C551D08DFCE1}" type="datetimeFigureOut">
               <a:rPr lang="en-US" smtClean="0"/>
-              <a:t>2/27/2015</a:t>
+              <a:t>3/1/2015</a:t>
             </a:fld>
             <a:endParaRPr lang="en-US"/>
           </a:p>
@@ -10276,469 +10271,6 @@
       </p:par>
     </p:tnLst>
   </p:timing>
-</p:sld>
-</file>
-
-<file path=ppt/slides/slide23.xml><?xml version="1.0" encoding="utf-8"?>
-<p:sld xmlns:a="http://schemas.openxmlformats.org/drawingml/2006/main" xmlns:r="http://schemas.openxmlformats.org/officeDocument/2006/relationships" xmlns:p="http://schemas.openxmlformats.org/presentationml/2006/main">
-  <p:cSld>
-    <p:spTree>
-      <p:nvGrpSpPr>
-        <p:cNvPr id="1" name=""/>
-        <p:cNvGrpSpPr/>
-        <p:nvPr/>
-      </p:nvGrpSpPr>
-      <p:grpSpPr>
-        <a:xfrm>
-          <a:off x="0" y="0"/>
-          <a:ext cx="0" cy="0"/>
-          <a:chOff x="0" y="0"/>
-          <a:chExt cx="0" cy="0"/>
-        </a:xfrm>
-      </p:grpSpPr>
-      <p:sp>
-        <p:nvSpPr>
-          <p:cNvPr id="2" name="Title 1"/>
-          <p:cNvSpPr>
-            <a:spLocks noGrp="1"/>
-          </p:cNvSpPr>
-          <p:nvPr>
-            <p:ph type="title"/>
-          </p:nvPr>
-        </p:nvSpPr>
-        <p:spPr/>
-        <p:txBody>
-          <a:bodyPr/>
-          <a:lstStyle/>
-          <a:p>
-            <a:r>
-              <a:rPr lang="en-US" dirty="0" smtClean="0"/>
-              <a:t>What did we learn today?</a:t>
-            </a:r>
-            <a:endParaRPr lang="en-US" dirty="0"/>
-          </a:p>
-        </p:txBody>
-      </p:sp>
-      <p:sp>
-        <p:nvSpPr>
-          <p:cNvPr id="3" name="Content Placeholder 2"/>
-          <p:cNvSpPr>
-            <a:spLocks noGrp="1"/>
-          </p:cNvSpPr>
-          <p:nvPr>
-            <p:ph sz="quarter" idx="10"/>
-          </p:nvPr>
-        </p:nvSpPr>
-        <p:spPr/>
-        <p:txBody>
-          <a:bodyPr/>
-          <a:lstStyle/>
-          <a:p>
-            <a:r>
-              <a:rPr lang="en-US" dirty="0" smtClean="0"/>
-              <a:t>Advanced layouts in </a:t>
-            </a:r>
-            <a:r>
-              <a:rPr lang="en-US" dirty="0" err="1" smtClean="0"/>
-              <a:t>Jinja</a:t>
-            </a:r>
-            <a:endParaRPr lang="en-US" dirty="0" smtClean="0"/>
-          </a:p>
-          <a:p>
-            <a:r>
-              <a:rPr lang="en-US" dirty="0" smtClean="0"/>
-              <a:t>How to use a relational database</a:t>
-            </a:r>
-          </a:p>
-          <a:p>
-            <a:r>
-              <a:rPr lang="en-US" dirty="0" smtClean="0"/>
-              <a:t>A bit of Bootstrap</a:t>
-            </a:r>
-          </a:p>
-          <a:p>
-            <a:r>
-              <a:rPr lang="en-US" dirty="0" smtClean="0"/>
-              <a:t>Object oriented design</a:t>
-            </a:r>
-            <a:endParaRPr lang="en-US" dirty="0"/>
-          </a:p>
-        </p:txBody>
-      </p:sp>
-    </p:spTree>
-    <p:extLst>
-      <p:ext uri="{BB962C8B-B14F-4D97-AF65-F5344CB8AC3E}">
-        <p14:creationId xmlns:p14="http://schemas.microsoft.com/office/powerpoint/2010/main" val="708225977"/>
-      </p:ext>
-    </p:extLst>
-  </p:cSld>
-  <p:clrMapOvr>
-    <a:masterClrMapping/>
-  </p:clrMapOvr>
-  <mc:AlternateContent xmlns:mc="http://schemas.openxmlformats.org/markup-compatibility/2006">
-    <mc:Choice xmlns:p14="http://schemas.microsoft.com/office/powerpoint/2010/main" Requires="p14">
-      <p:transition spd="slow" p14:dur="2000"/>
-    </mc:Choice>
-    <mc:Fallback>
-      <p:transition spd="slow"/>
-    </mc:Fallback>
-  </mc:AlternateContent>
-</p:sld>
-</file>
-
-<file path=ppt/slides/slide24.xml><?xml version="1.0" encoding="utf-8"?>
-<p:sld xmlns:a="http://schemas.openxmlformats.org/drawingml/2006/main" xmlns:r="http://schemas.openxmlformats.org/officeDocument/2006/relationships" xmlns:p="http://schemas.openxmlformats.org/presentationml/2006/main">
-  <p:cSld>
-    <p:spTree>
-      <p:nvGrpSpPr>
-        <p:cNvPr id="1" name=""/>
-        <p:cNvGrpSpPr/>
-        <p:nvPr/>
-      </p:nvGrpSpPr>
-      <p:grpSpPr>
-        <a:xfrm>
-          <a:off x="0" y="0"/>
-          <a:ext cx="0" cy="0"/>
-          <a:chOff x="0" y="0"/>
-          <a:chExt cx="0" cy="0"/>
-        </a:xfrm>
-      </p:grpSpPr>
-      <p:sp>
-        <p:nvSpPr>
-          <p:cNvPr id="2" name="Title 1"/>
-          <p:cNvSpPr>
-            <a:spLocks noGrp="1"/>
-          </p:cNvSpPr>
-          <p:nvPr>
-            <p:ph type="title"/>
-          </p:nvPr>
-        </p:nvSpPr>
-        <p:spPr/>
-        <p:txBody>
-          <a:bodyPr/>
-          <a:lstStyle/>
-          <a:p>
-            <a:r>
-              <a:rPr lang="en-US" dirty="0" smtClean="0"/>
-              <a:t>Where do we go now?</a:t>
-            </a:r>
-            <a:endParaRPr lang="en-US" dirty="0"/>
-          </a:p>
-        </p:txBody>
-      </p:sp>
-      <p:sp>
-        <p:nvSpPr>
-          <p:cNvPr id="3" name="Content Placeholder 2"/>
-          <p:cNvSpPr>
-            <a:spLocks noGrp="1"/>
-          </p:cNvSpPr>
-          <p:nvPr>
-            <p:ph sz="quarter" idx="10"/>
-          </p:nvPr>
-        </p:nvSpPr>
-        <p:spPr/>
-        <p:txBody>
-          <a:bodyPr/>
-          <a:lstStyle/>
-          <a:p>
-            <a:r>
-              <a:rPr lang="en-US" dirty="0" smtClean="0"/>
-              <a:t>For your growth</a:t>
-            </a:r>
-          </a:p>
-          <a:p>
-            <a:pPr lvl="1"/>
-            <a:r>
-              <a:rPr lang="en-US" dirty="0" smtClean="0"/>
-              <a:t>What interested you the most?</a:t>
-            </a:r>
-          </a:p>
-          <a:p>
-            <a:r>
-              <a:rPr lang="en-US" dirty="0" smtClean="0"/>
-              <a:t>For a deeper understanding</a:t>
-            </a:r>
-          </a:p>
-          <a:p>
-            <a:pPr lvl="1"/>
-            <a:r>
-              <a:rPr lang="en-US" dirty="0" smtClean="0"/>
-              <a:t>What can we do with the app?</a:t>
-            </a:r>
-            <a:endParaRPr lang="en-US" dirty="0"/>
-          </a:p>
-        </p:txBody>
-      </p:sp>
-    </p:spTree>
-    <p:extLst>
-      <p:ext uri="{BB962C8B-B14F-4D97-AF65-F5344CB8AC3E}">
-        <p14:creationId xmlns:p14="http://schemas.microsoft.com/office/powerpoint/2010/main" val="2467499197"/>
-      </p:ext>
-    </p:extLst>
-  </p:cSld>
-  <p:clrMapOvr>
-    <a:masterClrMapping/>
-  </p:clrMapOvr>
-</p:sld>
-</file>
-
-<file path=ppt/slides/slide25.xml><?xml version="1.0" encoding="utf-8"?>
-<p:sld xmlns:a="http://schemas.openxmlformats.org/drawingml/2006/main" xmlns:r="http://schemas.openxmlformats.org/officeDocument/2006/relationships" xmlns:p="http://schemas.openxmlformats.org/presentationml/2006/main">
-  <p:cSld>
-    <p:spTree>
-      <p:nvGrpSpPr>
-        <p:cNvPr id="1" name=""/>
-        <p:cNvGrpSpPr/>
-        <p:nvPr/>
-      </p:nvGrpSpPr>
-      <p:grpSpPr>
-        <a:xfrm>
-          <a:off x="0" y="0"/>
-          <a:ext cx="0" cy="0"/>
-          <a:chOff x="0" y="0"/>
-          <a:chExt cx="0" cy="0"/>
-        </a:xfrm>
-      </p:grpSpPr>
-      <p:sp>
-        <p:nvSpPr>
-          <p:cNvPr id="2" name="Title 1"/>
-          <p:cNvSpPr>
-            <a:spLocks noGrp="1"/>
-          </p:cNvSpPr>
-          <p:nvPr>
-            <p:ph type="title"/>
-          </p:nvPr>
-        </p:nvSpPr>
-        <p:spPr/>
-        <p:txBody>
-          <a:bodyPr/>
-          <a:lstStyle/>
-          <a:p>
-            <a:r>
-              <a:rPr lang="en-US" dirty="0" smtClean="0"/>
-              <a:t>Data design</a:t>
-            </a:r>
-            <a:endParaRPr lang="en-US" dirty="0"/>
-          </a:p>
-        </p:txBody>
-      </p:sp>
-      <p:sp>
-        <p:nvSpPr>
-          <p:cNvPr id="3" name="Content Placeholder 2"/>
-          <p:cNvSpPr>
-            <a:spLocks noGrp="1"/>
-          </p:cNvSpPr>
-          <p:nvPr>
-            <p:ph sz="quarter" idx="10"/>
-          </p:nvPr>
-        </p:nvSpPr>
-        <p:spPr/>
-        <p:txBody>
-          <a:bodyPr/>
-          <a:lstStyle/>
-          <a:p>
-            <a:r>
-              <a:rPr lang="en-US" dirty="0" err="1" smtClean="0"/>
-              <a:t>Redis</a:t>
-            </a:r>
-            <a:r>
-              <a:rPr lang="en-US" dirty="0" smtClean="0"/>
-              <a:t> MVA</a:t>
-            </a:r>
-          </a:p>
-          <a:p>
-            <a:r>
-              <a:rPr lang="en-US" dirty="0" smtClean="0"/>
-              <a:t>SQL Server MVA</a:t>
-            </a:r>
-          </a:p>
-          <a:p>
-            <a:r>
-              <a:rPr lang="en-US" dirty="0" err="1" smtClean="0"/>
-              <a:t>MongoDB</a:t>
-            </a:r>
-            <a:r>
-              <a:rPr lang="en-US" dirty="0" smtClean="0"/>
-              <a:t> MVA</a:t>
-            </a:r>
-            <a:endParaRPr lang="en-US" dirty="0"/>
-          </a:p>
-        </p:txBody>
-      </p:sp>
-    </p:spTree>
-    <p:extLst>
-      <p:ext uri="{BB962C8B-B14F-4D97-AF65-F5344CB8AC3E}">
-        <p14:creationId xmlns:p14="http://schemas.microsoft.com/office/powerpoint/2010/main" val="745934202"/>
-      </p:ext>
-    </p:extLst>
-  </p:cSld>
-  <p:clrMapOvr>
-    <a:masterClrMapping/>
-  </p:clrMapOvr>
-</p:sld>
-</file>
-
-<file path=ppt/slides/slide26.xml><?xml version="1.0" encoding="utf-8"?>
-<p:sld xmlns:a="http://schemas.openxmlformats.org/drawingml/2006/main" xmlns:r="http://schemas.openxmlformats.org/officeDocument/2006/relationships" xmlns:p="http://schemas.openxmlformats.org/presentationml/2006/main">
-  <p:cSld>
-    <p:spTree>
-      <p:nvGrpSpPr>
-        <p:cNvPr id="1" name=""/>
-        <p:cNvGrpSpPr/>
-        <p:nvPr/>
-      </p:nvGrpSpPr>
-      <p:grpSpPr>
-        <a:xfrm>
-          <a:off x="0" y="0"/>
-          <a:ext cx="0" cy="0"/>
-          <a:chOff x="0" y="0"/>
-          <a:chExt cx="0" cy="0"/>
-        </a:xfrm>
-      </p:grpSpPr>
-      <p:sp>
-        <p:nvSpPr>
-          <p:cNvPr id="2" name="Title 1"/>
-          <p:cNvSpPr>
-            <a:spLocks noGrp="1"/>
-          </p:cNvSpPr>
-          <p:nvPr>
-            <p:ph type="title"/>
-          </p:nvPr>
-        </p:nvSpPr>
-        <p:spPr/>
-        <p:txBody>
-          <a:bodyPr/>
-          <a:lstStyle/>
-          <a:p>
-            <a:r>
-              <a:rPr lang="en-US" dirty="0" smtClean="0"/>
-              <a:t>Front end design</a:t>
-            </a:r>
-            <a:endParaRPr lang="en-US" dirty="0"/>
-          </a:p>
-        </p:txBody>
-      </p:sp>
-      <p:sp>
-        <p:nvSpPr>
-          <p:cNvPr id="3" name="Content Placeholder 2"/>
-          <p:cNvSpPr>
-            <a:spLocks noGrp="1"/>
-          </p:cNvSpPr>
-          <p:nvPr>
-            <p:ph sz="quarter" idx="10"/>
-          </p:nvPr>
-        </p:nvSpPr>
-        <p:spPr/>
-        <p:txBody>
-          <a:bodyPr/>
-          <a:lstStyle/>
-          <a:p>
-            <a:r>
-              <a:rPr lang="en-US" dirty="0" smtClean="0"/>
-              <a:t>Bootstrap MVA</a:t>
-            </a:r>
-          </a:p>
-          <a:p>
-            <a:r>
-              <a:rPr lang="en-US" dirty="0" smtClean="0"/>
-              <a:t>CSS MVA</a:t>
-            </a:r>
-            <a:endParaRPr lang="en-US" dirty="0"/>
-          </a:p>
-        </p:txBody>
-      </p:sp>
-    </p:spTree>
-    <p:extLst>
-      <p:ext uri="{BB962C8B-B14F-4D97-AF65-F5344CB8AC3E}">
-        <p14:creationId xmlns:p14="http://schemas.microsoft.com/office/powerpoint/2010/main" val="2328056341"/>
-      </p:ext>
-    </p:extLst>
-  </p:cSld>
-  <p:clrMapOvr>
-    <a:masterClrMapping/>
-  </p:clrMapOvr>
-</p:sld>
-</file>
-
-<file path=ppt/slides/slide27.xml><?xml version="1.0" encoding="utf-8"?>
-<p:sld xmlns:a="http://schemas.openxmlformats.org/drawingml/2006/main" xmlns:r="http://schemas.openxmlformats.org/officeDocument/2006/relationships" xmlns:p="http://schemas.openxmlformats.org/presentationml/2006/main">
-  <p:cSld>
-    <p:spTree>
-      <p:nvGrpSpPr>
-        <p:cNvPr id="1" name=""/>
-        <p:cNvGrpSpPr/>
-        <p:nvPr/>
-      </p:nvGrpSpPr>
-      <p:grpSpPr>
-        <a:xfrm>
-          <a:off x="0" y="0"/>
-          <a:ext cx="0" cy="0"/>
-          <a:chOff x="0" y="0"/>
-          <a:chExt cx="0" cy="0"/>
-        </a:xfrm>
-      </p:grpSpPr>
-      <p:sp>
-        <p:nvSpPr>
-          <p:cNvPr id="2" name="Title 1"/>
-          <p:cNvSpPr>
-            <a:spLocks noGrp="1"/>
-          </p:cNvSpPr>
-          <p:nvPr>
-            <p:ph type="title"/>
-          </p:nvPr>
-        </p:nvSpPr>
-        <p:spPr/>
-        <p:txBody>
-          <a:bodyPr/>
-          <a:lstStyle/>
-          <a:p>
-            <a:r>
-              <a:rPr lang="en-US" dirty="0" smtClean="0"/>
-              <a:t>Back end design</a:t>
-            </a:r>
-            <a:endParaRPr lang="en-US" dirty="0"/>
-          </a:p>
-        </p:txBody>
-      </p:sp>
-      <p:sp>
-        <p:nvSpPr>
-          <p:cNvPr id="3" name="Content Placeholder 2"/>
-          <p:cNvSpPr>
-            <a:spLocks noGrp="1"/>
-          </p:cNvSpPr>
-          <p:nvPr>
-            <p:ph sz="quarter" idx="10"/>
-          </p:nvPr>
-        </p:nvSpPr>
-        <p:spPr/>
-        <p:txBody>
-          <a:bodyPr/>
-          <a:lstStyle/>
-          <a:p>
-            <a:r>
-              <a:rPr lang="en-US" dirty="0" smtClean="0"/>
-              <a:t>Absolute beginner's guide to C#</a:t>
-            </a:r>
-          </a:p>
-          <a:p>
-            <a:r>
-              <a:rPr lang="en-US" dirty="0" smtClean="0"/>
-              <a:t>Introduction to MVC</a:t>
-            </a:r>
-            <a:endParaRPr lang="en-US" dirty="0"/>
-          </a:p>
-        </p:txBody>
-      </p:sp>
-    </p:spTree>
-    <p:extLst>
-      <p:ext uri="{BB962C8B-B14F-4D97-AF65-F5344CB8AC3E}">
-        <p14:creationId xmlns:p14="http://schemas.microsoft.com/office/powerpoint/2010/main" val="1215635806"/>
-      </p:ext>
-    </p:extLst>
-  </p:cSld>
-  <p:clrMapOvr>
-    <a:masterClrMapping/>
-  </p:clrMapOvr>
 </p:sld>
 </file>
 
@@ -12573,12 +12105,9 @@
 </file>
 
 <file path=customXml/item1.xml><?xml version="1.0" encoding="utf-8"?>
-<?mso-contentType ?>
-<FormTemplates xmlns="http://schemas.microsoft.com/sharepoint/v3/contenttype/forms">
-  <Display>DocumentLibraryForm</Display>
-  <Edit>DocumentLibraryForm</Edit>
-  <New>DocumentLibraryForm</New>
-</FormTemplates>
+<p:properties xmlns:p="http://schemas.microsoft.com/office/2006/metadata/properties" xmlns:xsi="http://www.w3.org/2001/XMLSchema-instance" xmlns:pc="http://schemas.microsoft.com/office/infopath/2007/PartnerControls">
+  <documentManagement/>
+</p:properties>
 </file>
 
 <file path=customXml/item2.xml><?xml version="1.0" encoding="utf-8"?>
@@ -12722,15 +12251,26 @@
 </file>
 
 <file path=customXml/item3.xml><?xml version="1.0" encoding="utf-8"?>
-<p:properties xmlns:p="http://schemas.microsoft.com/office/2006/metadata/properties" xmlns:xsi="http://www.w3.org/2001/XMLSchema-instance" xmlns:pc="http://schemas.microsoft.com/office/infopath/2007/PartnerControls">
-  <documentManagement/>
-</p:properties>
+<?mso-contentType ?>
+<FormTemplates xmlns="http://schemas.microsoft.com/sharepoint/v3/contenttype/forms">
+  <Display>DocumentLibraryForm</Display>
+  <Edit>DocumentLibraryForm</Edit>
+  <New>DocumentLibraryForm</New>
+</FormTemplates>
 </file>
 
 <file path=customXml/itemProps1.xml><?xml version="1.0" encoding="utf-8"?>
-<ds:datastoreItem xmlns:ds="http://schemas.openxmlformats.org/officeDocument/2006/customXml" ds:itemID="{B0CA13EC-1D3C-4D6F-8D1C-E8A452CFC79A}">
+<ds:datastoreItem xmlns:ds="http://schemas.openxmlformats.org/officeDocument/2006/customXml" ds:itemID="{7025FDD9-4C58-4084-9F89-0E6ADD6FFF55}">
   <ds:schemaRefs>
-    <ds:schemaRef ds:uri="http://schemas.microsoft.com/sharepoint/v3/contenttype/forms"/>
+    <ds:schemaRef ds:uri="http://purl.org/dc/terms/"/>
+    <ds:schemaRef ds:uri="http://schemas.openxmlformats.org/package/2006/metadata/core-properties"/>
+    <ds:schemaRef ds:uri="http://schemas.microsoft.com/office/2006/documentManagement/types"/>
+    <ds:schemaRef ds:uri="http://schemas.microsoft.com/office/infopath/2007/PartnerControls"/>
+    <ds:schemaRef ds:uri="http://purl.org/dc/elements/1.1/"/>
+    <ds:schemaRef ds:uri="http://schemas.microsoft.com/office/2006/metadata/properties"/>
+    <ds:schemaRef ds:uri="e5a13ba8-98e3-4f23-a221-7ac9824aa662"/>
+    <ds:schemaRef ds:uri="http://www.w3.org/XML/1998/namespace"/>
+    <ds:schemaRef ds:uri="http://purl.org/dc/dcmitype/"/>
   </ds:schemaRefs>
 </ds:datastoreItem>
 </file>
@@ -12754,17 +12294,9 @@
 </file>
 
 <file path=customXml/itemProps3.xml><?xml version="1.0" encoding="utf-8"?>
-<ds:datastoreItem xmlns:ds="http://schemas.openxmlformats.org/officeDocument/2006/customXml" ds:itemID="{7025FDD9-4C58-4084-9F89-0E6ADD6FFF55}">
+<ds:datastoreItem xmlns:ds="http://schemas.openxmlformats.org/officeDocument/2006/customXml" ds:itemID="{B0CA13EC-1D3C-4D6F-8D1C-E8A452CFC79A}">
   <ds:schemaRefs>
-    <ds:schemaRef ds:uri="http://purl.org/dc/terms/"/>
-    <ds:schemaRef ds:uri="http://schemas.openxmlformats.org/package/2006/metadata/core-properties"/>
-    <ds:schemaRef ds:uri="http://schemas.microsoft.com/office/2006/documentManagement/types"/>
-    <ds:schemaRef ds:uri="http://schemas.microsoft.com/office/infopath/2007/PartnerControls"/>
-    <ds:schemaRef ds:uri="http://purl.org/dc/elements/1.1/"/>
-    <ds:schemaRef ds:uri="http://schemas.microsoft.com/office/2006/metadata/properties"/>
-    <ds:schemaRef ds:uri="e5a13ba8-98e3-4f23-a221-7ac9824aa662"/>
-    <ds:schemaRef ds:uri="http://www.w3.org/XML/1998/namespace"/>
-    <ds:schemaRef ds:uri="http://purl.org/dc/dcmitype/"/>
+    <ds:schemaRef ds:uri="http://schemas.microsoft.com/sharepoint/v3/contenttype/forms"/>
   </ds:schemaRefs>
 </ds:datastoreItem>
 </file>
</xml_diff>